<commit_message>
larger font size, not display nav-tab, and change to submit
</commit_message>
<xml_diff>
--- a/teaching-learning-outcome.pptx
+++ b/teaching-learning-outcome.pptx
@@ -107,6 +107,11 @@
       </a:defRPr>
     </a:lvl9pPr>
   </p:defaultTextStyle>
+  <p:extLst>
+    <p:ext uri="{EFAFB233-063F-42B5-8137-9DF3F51BA10A}">
+      <p15:sldGuideLst xmlns:p15="http://schemas.microsoft.com/office/powerpoint/2012/main"/>
+    </p:ext>
+  </p:extLst>
 </p:presentation>
 </file>
 
@@ -257,7 +262,7 @@
           <a:p>
             <a:fld id="{A19C76DD-76BE-E04E-949D-8A0218C122D4}" type="datetimeFigureOut">
               <a:rPr lang="en-US" smtClean="0"/>
-              <a:t>5/14/18</a:t>
+              <a:t>5/15/18</a:t>
             </a:fld>
             <a:endParaRPr lang="en-US"/>
           </a:p>
@@ -455,7 +460,7 @@
           <a:p>
             <a:fld id="{A19C76DD-76BE-E04E-949D-8A0218C122D4}" type="datetimeFigureOut">
               <a:rPr lang="en-US" smtClean="0"/>
-              <a:t>5/14/18</a:t>
+              <a:t>5/15/18</a:t>
             </a:fld>
             <a:endParaRPr lang="en-US"/>
           </a:p>
@@ -663,7 +668,7 @@
           <a:p>
             <a:fld id="{A19C76DD-76BE-E04E-949D-8A0218C122D4}" type="datetimeFigureOut">
               <a:rPr lang="en-US" smtClean="0"/>
-              <a:t>5/14/18</a:t>
+              <a:t>5/15/18</a:t>
             </a:fld>
             <a:endParaRPr lang="en-US"/>
           </a:p>
@@ -861,7 +866,7 @@
           <a:p>
             <a:fld id="{A19C76DD-76BE-E04E-949D-8A0218C122D4}" type="datetimeFigureOut">
               <a:rPr lang="en-US" smtClean="0"/>
-              <a:t>5/14/18</a:t>
+              <a:t>5/15/18</a:t>
             </a:fld>
             <a:endParaRPr lang="en-US"/>
           </a:p>
@@ -1136,7 +1141,7 @@
           <a:p>
             <a:fld id="{A19C76DD-76BE-E04E-949D-8A0218C122D4}" type="datetimeFigureOut">
               <a:rPr lang="en-US" smtClean="0"/>
-              <a:t>5/14/18</a:t>
+              <a:t>5/15/18</a:t>
             </a:fld>
             <a:endParaRPr lang="en-US"/>
           </a:p>
@@ -1401,7 +1406,7 @@
           <a:p>
             <a:fld id="{A19C76DD-76BE-E04E-949D-8A0218C122D4}" type="datetimeFigureOut">
               <a:rPr lang="en-US" smtClean="0"/>
-              <a:t>5/14/18</a:t>
+              <a:t>5/15/18</a:t>
             </a:fld>
             <a:endParaRPr lang="en-US"/>
           </a:p>
@@ -1813,7 +1818,7 @@
           <a:p>
             <a:fld id="{A19C76DD-76BE-E04E-949D-8A0218C122D4}" type="datetimeFigureOut">
               <a:rPr lang="en-US" smtClean="0"/>
-              <a:t>5/14/18</a:t>
+              <a:t>5/15/18</a:t>
             </a:fld>
             <a:endParaRPr lang="en-US"/>
           </a:p>
@@ -1954,7 +1959,7 @@
           <a:p>
             <a:fld id="{A19C76DD-76BE-E04E-949D-8A0218C122D4}" type="datetimeFigureOut">
               <a:rPr lang="en-US" smtClean="0"/>
-              <a:t>5/14/18</a:t>
+              <a:t>5/15/18</a:t>
             </a:fld>
             <a:endParaRPr lang="en-US"/>
           </a:p>
@@ -2067,7 +2072,7 @@
           <a:p>
             <a:fld id="{A19C76DD-76BE-E04E-949D-8A0218C122D4}" type="datetimeFigureOut">
               <a:rPr lang="en-US" smtClean="0"/>
-              <a:t>5/14/18</a:t>
+              <a:t>5/15/18</a:t>
             </a:fld>
             <a:endParaRPr lang="en-US"/>
           </a:p>
@@ -2378,7 +2383,7 @@
           <a:p>
             <a:fld id="{A19C76DD-76BE-E04E-949D-8A0218C122D4}" type="datetimeFigureOut">
               <a:rPr lang="en-US" smtClean="0"/>
-              <a:t>5/14/18</a:t>
+              <a:t>5/15/18</a:t>
             </a:fld>
             <a:endParaRPr lang="en-US"/>
           </a:p>
@@ -2666,7 +2671,7 @@
           <a:p>
             <a:fld id="{A19C76DD-76BE-E04E-949D-8A0218C122D4}" type="datetimeFigureOut">
               <a:rPr lang="en-US" smtClean="0"/>
-              <a:t>5/14/18</a:t>
+              <a:t>5/15/18</a:t>
             </a:fld>
             <a:endParaRPr lang="en-US"/>
           </a:p>
@@ -2907,7 +2912,7 @@
           <a:p>
             <a:fld id="{A19C76DD-76BE-E04E-949D-8A0218C122D4}" type="datetimeFigureOut">
               <a:rPr lang="en-US" smtClean="0"/>
-              <a:t>5/14/18</a:t>
+              <a:t>5/15/18</a:t>
             </a:fld>
             <a:endParaRPr lang="en-US"/>
           </a:p>
@@ -3434,7 +3439,28 @@
           <a:p>
             <a:pPr algn="ctr"/>
             <a:r>
+              <a:rPr lang="en-US" sz="8000" dirty="0">
+                <a:solidFill>
+                  <a:schemeClr val="accent5">
+                    <a:lumMod val="75000"/>
+                  </a:schemeClr>
+                </a:solidFill>
+                <a:cs typeface="Consolas" panose="020B0609020204030204" pitchFamily="49" charset="0"/>
+              </a:rPr>
+              <a:t>Step 1</a:t>
+            </a:r>
+            <a:br>
               <a:rPr lang="en-US" sz="11500" b="1" dirty="0">
+                <a:cs typeface="Consolas" panose="020B0609020204030204" pitchFamily="49" charset="0"/>
+              </a:rPr>
+            </a:br>
+            <a:r>
+              <a:rPr lang="en-US" sz="11500" b="1" dirty="0">
+                <a:solidFill>
+                  <a:schemeClr val="accent5">
+                    <a:lumMod val="50000"/>
+                  </a:schemeClr>
+                </a:solidFill>
                 <a:cs typeface="Consolas" panose="020B0609020204030204" pitchFamily="49" charset="0"/>
               </a:rPr>
               <a:t>Demonstration</a:t>
@@ -3502,7 +3528,27 @@
           <a:p>
             <a:pPr algn="ctr"/>
             <a:r>
+              <a:rPr lang="en-US" sz="9600" dirty="0">
+                <a:solidFill>
+                  <a:schemeClr val="accent6">
+                    <a:lumMod val="75000"/>
+                  </a:schemeClr>
+                </a:solidFill>
+                <a:cs typeface="Consolas" panose="020B0609020204030204" pitchFamily="49" charset="0"/>
+              </a:rPr>
+              <a:t>Step 2</a:t>
+            </a:r>
+            <a:br>
               <a:rPr lang="en-US" sz="16600" b="1" dirty="0"/>
+            </a:br>
+            <a:r>
+              <a:rPr lang="en-US" sz="16600" b="1" dirty="0">
+                <a:solidFill>
+                  <a:schemeClr val="accent6">
+                    <a:lumMod val="50000"/>
+                  </a:schemeClr>
+                </a:solidFill>
+              </a:rPr>
               <a:t>Learning</a:t>
             </a:r>
           </a:p>
@@ -3556,8 +3602,8 @@
         </p:nvSpPr>
         <p:spPr>
           <a:xfrm>
-            <a:off x="838200" y="365125"/>
-            <a:ext cx="10515600" cy="6049530"/>
+            <a:off x="278295" y="365125"/>
+            <a:ext cx="11675165" cy="6049530"/>
           </a:xfrm>
         </p:spPr>
         <p:txBody>
@@ -3568,9 +3614,36 @@
           <a:p>
             <a:pPr algn="ctr"/>
             <a:r>
+              <a:rPr lang="en-US" sz="9600" dirty="0">
+                <a:solidFill>
+                  <a:schemeClr val="accent4">
+                    <a:lumMod val="75000"/>
+                  </a:schemeClr>
+                </a:solidFill>
+                <a:cs typeface="Consolas" panose="020B0609020204030204" pitchFamily="49" charset="0"/>
+              </a:rPr>
+              <a:t>Step 3</a:t>
+            </a:r>
+            <a:br>
               <a:rPr lang="en-US" sz="9600" b="1" dirty="0"/>
+            </a:br>
+            <a:r>
+              <a:rPr lang="en-US" sz="11500" b="1" dirty="0">
+                <a:solidFill>
+                  <a:schemeClr val="accent4">
+                    <a:lumMod val="50000"/>
+                  </a:schemeClr>
+                </a:solidFill>
+              </a:rPr>
               <a:t>Learning outcome</a:t>
             </a:r>
+            <a:endParaRPr lang="en-US" sz="9600" b="1" dirty="0">
+              <a:solidFill>
+                <a:schemeClr val="accent4">
+                  <a:lumMod val="50000"/>
+                </a:schemeClr>
+              </a:solidFill>
+            </a:endParaRPr>
           </a:p>
         </p:txBody>
       </p:sp>

</xml_diff>